<commit_message>
Update Linear Regression notebook
</commit_message>
<xml_diff>
--- a/Presentations/Introduction to Machine Learning.pptx
+++ b/Presentations/Introduction to Machine Learning.pptx
@@ -116,6 +116,34 @@
     </a:lvl9pPr>
   </p:defaultTextStyle>
   <p:extLst>
+    <p:ext uri="{521415D9-36F7-43E2-AB2F-B90AF26B5E84}">
+      <p14:sectionLst xmlns:p14="http://schemas.microsoft.com/office/powerpoint/2010/main">
+        <p14:section name="Default Section" id="{02D2336C-FFF6-B14F-9B0F-B6E4A63525E4}">
+          <p14:sldIdLst>
+            <p14:sldId id="256"/>
+          </p14:sldIdLst>
+        </p14:section>
+        <p14:section name="Machine Learning" id="{7457CB9D-0AE1-0B40-AC5E-DE8F07FEB465}">
+          <p14:sldIdLst>
+            <p14:sldId id="257"/>
+            <p14:sldId id="258"/>
+            <p14:sldId id="259"/>
+            <p14:sldId id="260"/>
+            <p14:sldId id="261"/>
+            <p14:sldId id="262"/>
+            <p14:sldId id="263"/>
+            <p14:sldId id="264"/>
+          </p14:sldIdLst>
+        </p14:section>
+        <p14:section name="Linear Regression" id="{E255B8EB-9565-2B4D-8F83-01AD64CBD48D}">
+          <p14:sldIdLst>
+            <p14:sldId id="265"/>
+            <p14:sldId id="266"/>
+            <p14:sldId id="268"/>
+          </p14:sldIdLst>
+        </p14:section>
+      </p14:sectionLst>
+    </p:ext>
     <p:ext uri="{EFAFB233-063F-42B5-8137-9DF3F51BA10A}">
       <p15:sldGuideLst xmlns:p15="http://schemas.microsoft.com/office/powerpoint/2012/main"/>
     </p:ext>
@@ -853,7 +881,7 @@
             <a:fld id="{B61BEF0D-F0BB-DE4B-95CE-6DB70DBA9567}" type="datetimeFigureOut">
               <a:rPr lang="en-US" dirty="0"/>
               <a:pPr/>
-              <a:t>1/25/22</a:t>
+              <a:t>1/26/22</a:t>
             </a:fld>
             <a:endParaRPr lang="en-US" dirty="0"/>
           </a:p>
@@ -1105,7 +1133,7 @@
             <a:fld id="{B61BEF0D-F0BB-DE4B-95CE-6DB70DBA9567}" type="datetimeFigureOut">
               <a:rPr lang="en-US" dirty="0"/>
               <a:pPr/>
-              <a:t>1/25/22</a:t>
+              <a:t>1/26/22</a:t>
             </a:fld>
             <a:endParaRPr lang="en-US" dirty="0"/>
           </a:p>
@@ -1420,7 +1448,7 @@
             <a:fld id="{B61BEF0D-F0BB-DE4B-95CE-6DB70DBA9567}" type="datetimeFigureOut">
               <a:rPr lang="en-US" dirty="0"/>
               <a:pPr/>
-              <a:t>1/25/22</a:t>
+              <a:t>1/26/22</a:t>
             </a:fld>
             <a:endParaRPr lang="en-US" dirty="0"/>
           </a:p>
@@ -1762,7 +1790,7 @@
             <a:fld id="{B61BEF0D-F0BB-DE4B-95CE-6DB70DBA9567}" type="datetimeFigureOut">
               <a:rPr lang="en-US" dirty="0"/>
               <a:pPr/>
-              <a:t>1/25/22</a:t>
+              <a:t>1/26/22</a:t>
             </a:fld>
             <a:endParaRPr lang="en-US" dirty="0"/>
           </a:p>
@@ -2077,7 +2105,7 @@
             <a:fld id="{B61BEF0D-F0BB-DE4B-95CE-6DB70DBA9567}" type="datetimeFigureOut">
               <a:rPr lang="en-US" dirty="0"/>
               <a:pPr/>
-              <a:t>1/25/22</a:t>
+              <a:t>1/26/22</a:t>
             </a:fld>
             <a:endParaRPr lang="en-US" dirty="0"/>
           </a:p>
@@ -2471,7 +2499,7 @@
             <a:fld id="{B61BEF0D-F0BB-DE4B-95CE-6DB70DBA9567}" type="datetimeFigureOut">
               <a:rPr lang="en-US" dirty="0"/>
               <a:pPr/>
-              <a:t>1/25/22</a:t>
+              <a:t>1/26/22</a:t>
             </a:fld>
             <a:endParaRPr lang="en-US" dirty="0"/>
           </a:p>
@@ -2640,7 +2668,7 @@
           <a:p>
             <a:fld id="{55C6B4A9-1611-4792-9094-5F34BCA07E0B}" type="datetimeFigureOut">
               <a:rPr lang="en-US" dirty="0"/>
-              <a:t>1/25/22</a:t>
+              <a:t>1/26/22</a:t>
             </a:fld>
             <a:endParaRPr lang="en-US" dirty="0"/>
           </a:p>
@@ -2819,7 +2847,7 @@
             <a:fld id="{B61BEF0D-F0BB-DE4B-95CE-6DB70DBA9567}" type="datetimeFigureOut">
               <a:rPr lang="en-US" dirty="0"/>
               <a:pPr/>
-              <a:t>1/25/22</a:t>
+              <a:t>1/26/22</a:t>
             </a:fld>
             <a:endParaRPr lang="en-US" dirty="0"/>
           </a:p>
@@ -2995,7 +3023,7 @@
             <a:fld id="{B61BEF0D-F0BB-DE4B-95CE-6DB70DBA9567}" type="datetimeFigureOut">
               <a:rPr lang="en-US" dirty="0"/>
               <a:pPr/>
-              <a:t>1/25/22</a:t>
+              <a:t>1/26/22</a:t>
             </a:fld>
             <a:endParaRPr lang="en-US" dirty="0"/>
           </a:p>
@@ -3243,7 +3271,7 @@
             <a:fld id="{B61BEF0D-F0BB-DE4B-95CE-6DB70DBA9567}" type="datetimeFigureOut">
               <a:rPr lang="en-US" dirty="0"/>
               <a:pPr/>
-              <a:t>1/25/22</a:t>
+              <a:t>1/26/22</a:t>
             </a:fld>
             <a:endParaRPr lang="en-US" dirty="0"/>
           </a:p>
@@ -3473,7 +3501,7 @@
           <a:p>
             <a:fld id="{EB712588-04B1-427B-82EE-E8DB90309F08}" type="datetimeFigureOut">
               <a:rPr lang="en-US" dirty="0"/>
-              <a:t>1/25/22</a:t>
+              <a:t>1/26/22</a:t>
             </a:fld>
             <a:endParaRPr lang="en-US" dirty="0"/>
           </a:p>
@@ -3845,7 +3873,7 @@
             <a:fld id="{B61BEF0D-F0BB-DE4B-95CE-6DB70DBA9567}" type="datetimeFigureOut">
               <a:rPr lang="en-US" dirty="0"/>
               <a:pPr/>
-              <a:t>1/25/22</a:t>
+              <a:t>1/26/22</a:t>
             </a:fld>
             <a:endParaRPr lang="en-US" dirty="0"/>
           </a:p>
@@ -3969,7 +3997,7 @@
             <a:fld id="{B61BEF0D-F0BB-DE4B-95CE-6DB70DBA9567}" type="datetimeFigureOut">
               <a:rPr lang="en-US" dirty="0"/>
               <a:pPr/>
-              <a:t>1/25/22</a:t>
+              <a:t>1/26/22</a:t>
             </a:fld>
             <a:endParaRPr lang="en-US" dirty="0"/>
           </a:p>
@@ -4066,7 +4094,7 @@
             <a:fld id="{B61BEF0D-F0BB-DE4B-95CE-6DB70DBA9567}" type="datetimeFigureOut">
               <a:rPr lang="en-US" dirty="0"/>
               <a:pPr/>
-              <a:t>1/25/22</a:t>
+              <a:t>1/26/22</a:t>
             </a:fld>
             <a:endParaRPr lang="en-US" dirty="0"/>
           </a:p>
@@ -4320,7 +4348,7 @@
           <a:p>
             <a:fld id="{42A54C80-263E-416B-A8E0-580EDEADCBDC}" type="datetimeFigureOut">
               <a:rPr lang="en-US" dirty="0"/>
-              <a:t>1/25/22</a:t>
+              <a:t>1/26/22</a:t>
             </a:fld>
             <a:endParaRPr lang="en-US" dirty="0"/>
           </a:p>
@@ -4579,7 +4607,7 @@
             <a:fld id="{B61BEF0D-F0BB-DE4B-95CE-6DB70DBA9567}" type="datetimeFigureOut">
               <a:rPr lang="en-US" dirty="0"/>
               <a:pPr/>
-              <a:t>1/25/22</a:t>
+              <a:t>1/26/22</a:t>
             </a:fld>
             <a:endParaRPr lang="en-US" dirty="0"/>
           </a:p>
@@ -5322,7 +5350,7 @@
             <a:fld id="{B61BEF0D-F0BB-DE4B-95CE-6DB70DBA9567}" type="datetimeFigureOut">
               <a:rPr lang="en-US" dirty="0"/>
               <a:pPr/>
-              <a:t>1/25/22</a:t>
+              <a:t>1/26/22</a:t>
             </a:fld>
             <a:endParaRPr lang="en-US" dirty="0"/>
           </a:p>
@@ -6474,8 +6502,8 @@
           </a:p>
         </p:txBody>
       </p:sp>
-      <mc:AlternateContent xmlns:mc="http://schemas.openxmlformats.org/markup-compatibility/2006" xmlns:a14="http://schemas.microsoft.com/office/drawing/2010/main">
-        <mc:Choice Requires="a14">
+      <mc:AlternateContent xmlns:mc="http://schemas.openxmlformats.org/markup-compatibility/2006">
+        <mc:Choice xmlns:a14="http://schemas.microsoft.com/office/drawing/2010/main" Requires="a14">
           <p:sp>
             <p:nvSpPr>
               <p:cNvPr id="5" name="Content Placeholder 4">
@@ -6672,7 +6700,7 @@
             </p:txBody>
           </p:sp>
         </mc:Choice>
-        <mc:Fallback xmlns="">
+        <mc:Fallback>
           <p:sp>
             <p:nvSpPr>
               <p:cNvPr id="5" name="Content Placeholder 4">
@@ -8166,9 +8194,12 @@
 </file>
 
 <file path=customXml/item1.xml><?xml version="1.0" encoding="utf-8"?>
-<p:properties xmlns:p="http://schemas.microsoft.com/office/2006/metadata/properties" xmlns:xsi="http://www.w3.org/2001/XMLSchema-instance" xmlns:pc="http://schemas.microsoft.com/office/infopath/2007/PartnerControls">
-  <documentManagement/>
-</p:properties>
+<?mso-contentType ?>
+<FormTemplates xmlns="http://schemas.microsoft.com/sharepoint/v3/contenttype/forms">
+  <Display>DocumentLibraryForm</Display>
+  <Edit>DocumentLibraryForm</Edit>
+  <New>DocumentLibraryForm</New>
+</FormTemplates>
 </file>
 
 <file path=customXml/item2.xml><?xml version="1.0" encoding="utf-8"?>
@@ -8344,26 +8375,15 @@
 </file>
 
 <file path=customXml/item3.xml><?xml version="1.0" encoding="utf-8"?>
-<?mso-contentType ?>
-<FormTemplates xmlns="http://schemas.microsoft.com/sharepoint/v3/contenttype/forms">
-  <Display>DocumentLibraryForm</Display>
-  <Edit>DocumentLibraryForm</Edit>
-  <New>DocumentLibraryForm</New>
-</FormTemplates>
+<p:properties xmlns:p="http://schemas.microsoft.com/office/2006/metadata/properties" xmlns:xsi="http://www.w3.org/2001/XMLSchema-instance" xmlns:pc="http://schemas.microsoft.com/office/infopath/2007/PartnerControls">
+  <documentManagement/>
+</p:properties>
 </file>
 
 <file path=customXml/itemProps1.xml><?xml version="1.0" encoding="utf-8"?>
-<ds:datastoreItem xmlns:ds="http://schemas.openxmlformats.org/officeDocument/2006/customXml" ds:itemID="{0C813E75-B549-4BB2-ADE9-AC583B95A259}">
+<ds:datastoreItem xmlns:ds="http://schemas.openxmlformats.org/officeDocument/2006/customXml" ds:itemID="{E704A8FB-8897-4D5A-8E5F-8B030F42DD7E}">
   <ds:schemaRefs>
-    <ds:schemaRef ds:uri="http://purl.org/dc/dcmitype/"/>
-    <ds:schemaRef ds:uri="http://purl.org/dc/terms/"/>
-    <ds:schemaRef ds:uri="http://schemas.openxmlformats.org/package/2006/metadata/core-properties"/>
-    <ds:schemaRef ds:uri="http://schemas.microsoft.com/office/2006/documentManagement/types"/>
-    <ds:schemaRef ds:uri="http://purl.org/dc/elements/1.1/"/>
-    <ds:schemaRef ds:uri="http://schemas.microsoft.com/office/2006/metadata/properties"/>
-    <ds:schemaRef ds:uri="5d8c350d-e8cd-4f76-ac25-7766eae22281"/>
-    <ds:schemaRef ds:uri="http://schemas.microsoft.com/office/infopath/2007/PartnerControls"/>
-    <ds:schemaRef ds:uri="http://www.w3.org/XML/1998/namespace"/>
+    <ds:schemaRef ds:uri="http://schemas.microsoft.com/sharepoint/v3/contenttype/forms"/>
   </ds:schemaRefs>
 </ds:datastoreItem>
 </file>
@@ -8387,9 +8407,17 @@
 </file>
 
 <file path=customXml/itemProps3.xml><?xml version="1.0" encoding="utf-8"?>
-<ds:datastoreItem xmlns:ds="http://schemas.openxmlformats.org/officeDocument/2006/customXml" ds:itemID="{E704A8FB-8897-4D5A-8E5F-8B030F42DD7E}">
+<ds:datastoreItem xmlns:ds="http://schemas.openxmlformats.org/officeDocument/2006/customXml" ds:itemID="{0C813E75-B549-4BB2-ADE9-AC583B95A259}">
   <ds:schemaRefs>
-    <ds:schemaRef ds:uri="http://schemas.microsoft.com/sharepoint/v3/contenttype/forms"/>
+    <ds:schemaRef ds:uri="http://purl.org/dc/dcmitype/"/>
+    <ds:schemaRef ds:uri="http://purl.org/dc/terms/"/>
+    <ds:schemaRef ds:uri="http://schemas.openxmlformats.org/package/2006/metadata/core-properties"/>
+    <ds:schemaRef ds:uri="http://schemas.microsoft.com/office/2006/documentManagement/types"/>
+    <ds:schemaRef ds:uri="http://purl.org/dc/elements/1.1/"/>
+    <ds:schemaRef ds:uri="http://schemas.microsoft.com/office/2006/metadata/properties"/>
+    <ds:schemaRef ds:uri="5d8c350d-e8cd-4f76-ac25-7766eae22281"/>
+    <ds:schemaRef ds:uri="http://schemas.microsoft.com/office/infopath/2007/PartnerControls"/>
+    <ds:schemaRef ds:uri="http://www.w3.org/XML/1998/namespace"/>
   </ds:schemaRefs>
 </ds:datastoreItem>
 </file>
</xml_diff>